<commit_message>
Flow diagram and powerpoint update
</commit_message>
<xml_diff>
--- a/documents/RAC - Hackathon - QRCodes - Team Quick Response.pptx
+++ b/documents/RAC - Hackathon - QRCodes - Team Quick Response.pptx
@@ -8,10 +8,15 @@
     <p:sldId id="2076137505" r:id="rId2"/>
     <p:sldId id="2076137506" r:id="rId3"/>
     <p:sldId id="2076137502" r:id="rId4"/>
-    <p:sldId id="2076137497" r:id="rId5"/>
-    <p:sldId id="2076137498" r:id="rId6"/>
-    <p:sldId id="2076137503" r:id="rId7"/>
-    <p:sldId id="2076137507" r:id="rId8"/>
+    <p:sldId id="2076137512" r:id="rId5"/>
+    <p:sldId id="2076137510" r:id="rId6"/>
+    <p:sldId id="2076137509" r:id="rId7"/>
+    <p:sldId id="2076137511" r:id="rId8"/>
+    <p:sldId id="2076137497" r:id="rId9"/>
+    <p:sldId id="2076137498" r:id="rId10"/>
+    <p:sldId id="2076137503" r:id="rId11"/>
+    <p:sldId id="2076137507" r:id="rId12"/>
+    <p:sldId id="2076137508" r:id="rId13"/>
   </p:sldIdLst>
   <p:sldSz cx="12192000" cy="6858000"/>
   <p:notesSz cx="6858000" cy="9144000"/>
@@ -3534,7 +3539,7 @@
                   </a:schemeClr>
                 </a:solidFill>
               </a:rPr>
-              <a:t>ETS November 2022 Hackathon</a:t>
+              <a:t>Team Quick Response!</a:t>
             </a:r>
             <a:endParaRPr lang="en-AU" sz="6600" dirty="0">
               <a:solidFill>
@@ -3546,10 +3551,659 @@
           </a:p>
         </p:txBody>
       </p:sp>
+      <p:sp>
+        <p:nvSpPr>
+          <p:cNvPr id="3" name="TextBox 2">
+            <a:extLst>
+              <a:ext uri="{FF2B5EF4-FFF2-40B4-BE49-F238E27FC236}">
+                <a16:creationId xmlns:a16="http://schemas.microsoft.com/office/drawing/2014/main" id="{DCB07830-BB5B-B927-6E92-A3358F957A6F}"/>
+              </a:ext>
+            </a:extLst>
+          </p:cNvPr>
+          <p:cNvSpPr txBox="1"/>
+          <p:nvPr/>
+        </p:nvSpPr>
+        <p:spPr>
+          <a:xfrm>
+            <a:off x="3339084" y="4621400"/>
+            <a:ext cx="5513832" cy="646331"/>
+          </a:xfrm>
+          <a:prstGeom prst="rect">
+            <a:avLst/>
+          </a:prstGeom>
+          <a:noFill/>
+        </p:spPr>
+        <p:txBody>
+          <a:bodyPr wrap="square" rtlCol="0">
+            <a:spAutoFit/>
+          </a:bodyPr>
+          <a:lstStyle/>
+          <a:p>
+            <a:pPr algn="ctr"/>
+            <a:r>
+              <a:rPr lang="en-AU" sz="3600" dirty="0">
+                <a:solidFill>
+                  <a:schemeClr val="accent6">
+                    <a:lumMod val="50000"/>
+                  </a:schemeClr>
+                </a:solidFill>
+                <a:latin typeface="+mj-lt"/>
+                <a:ea typeface="+mj-ea"/>
+                <a:cs typeface="+mj-cs"/>
+              </a:rPr>
+              <a:t>QR </a:t>
+            </a:r>
+            <a:r>
+              <a:rPr lang="en-AU" sz="3600" dirty="0"/>
+              <a:t> </a:t>
+            </a:r>
+            <a:r>
+              <a:rPr lang="en-AU" sz="3600" dirty="0">
+                <a:solidFill>
+                  <a:schemeClr val="accent6">
+                    <a:lumMod val="50000"/>
+                  </a:schemeClr>
+                </a:solidFill>
+                <a:latin typeface="+mj-lt"/>
+                <a:ea typeface="+mj-ea"/>
+                <a:cs typeface="+mj-cs"/>
+              </a:rPr>
+              <a:t>Codes</a:t>
+            </a:r>
+          </a:p>
+        </p:txBody>
+      </p:sp>
+      <p:pic>
+        <p:nvPicPr>
+          <p:cNvPr id="2050" name="Picture 2" descr="QRCodeLibrary Icon">
+            <a:extLst>
+              <a:ext uri="{FF2B5EF4-FFF2-40B4-BE49-F238E27FC236}">
+                <a16:creationId xmlns:a16="http://schemas.microsoft.com/office/drawing/2014/main" id="{AD34C5EE-E8A2-A205-78DA-AB81C200FB4F}"/>
+              </a:ext>
+            </a:extLst>
+          </p:cNvPr>
+          <p:cNvPicPr>
+            <a:picLocks noChangeAspect="1" noChangeArrowheads="1"/>
+          </p:cNvPicPr>
+          <p:nvPr/>
+        </p:nvPicPr>
+        <p:blipFill>
+          <a:blip r:embed="rId2">
+            <a:extLst>
+              <a:ext uri="{28A0092B-C50C-407E-A947-70E740481C1C}">
+                <a14:useLocalDpi xmlns:a14="http://schemas.microsoft.com/office/drawing/2010/main" val="0"/>
+              </a:ext>
+            </a:extLst>
+          </a:blip>
+          <a:srcRect/>
+          <a:stretch>
+            <a:fillRect/>
+          </a:stretch>
+        </p:blipFill>
+        <p:spPr bwMode="auto">
+          <a:xfrm>
+            <a:off x="363793" y="4048531"/>
+            <a:ext cx="2438400" cy="2438400"/>
+          </a:xfrm>
+          <a:prstGeom prst="rect">
+            <a:avLst/>
+          </a:prstGeom>
+          <a:noFill/>
+          <a:extLst>
+            <a:ext uri="{909E8E84-426E-40DD-AFC4-6F175D3DCCD1}">
+              <a14:hiddenFill xmlns:a14="http://schemas.microsoft.com/office/drawing/2010/main">
+                <a:solidFill>
+                  <a:srgbClr val="FFFFFF"/>
+                </a:solidFill>
+              </a14:hiddenFill>
+            </a:ext>
+          </a:extLst>
+        </p:spPr>
+      </p:pic>
+      <p:pic>
+        <p:nvPicPr>
+          <p:cNvPr id="2052" name="Picture 4">
+            <a:extLst>
+              <a:ext uri="{FF2B5EF4-FFF2-40B4-BE49-F238E27FC236}">
+                <a16:creationId xmlns:a16="http://schemas.microsoft.com/office/drawing/2014/main" id="{7D0D5253-FA9B-A29F-9558-B04834E22C4A}"/>
+              </a:ext>
+            </a:extLst>
+          </p:cNvPr>
+          <p:cNvPicPr>
+            <a:picLocks noChangeAspect="1" noChangeArrowheads="1"/>
+          </p:cNvPicPr>
+          <p:nvPr/>
+        </p:nvPicPr>
+        <p:blipFill>
+          <a:blip r:embed="rId3">
+            <a:extLst>
+              <a:ext uri="{28A0092B-C50C-407E-A947-70E740481C1C}">
+                <a14:useLocalDpi xmlns:a14="http://schemas.microsoft.com/office/drawing/2010/main" val="0"/>
+              </a:ext>
+            </a:extLst>
+          </a:blip>
+          <a:srcRect/>
+          <a:stretch>
+            <a:fillRect/>
+          </a:stretch>
+        </p:blipFill>
+        <p:spPr bwMode="auto">
+          <a:xfrm>
+            <a:off x="9163665" y="4023747"/>
+            <a:ext cx="2524432" cy="2524432"/>
+          </a:xfrm>
+          <a:prstGeom prst="rect">
+            <a:avLst/>
+          </a:prstGeom>
+          <a:noFill/>
+          <a:extLst>
+            <a:ext uri="{909E8E84-426E-40DD-AFC4-6F175D3DCCD1}">
+              <a14:hiddenFill xmlns:a14="http://schemas.microsoft.com/office/drawing/2010/main">
+                <a:solidFill>
+                  <a:srgbClr val="FFFFFF"/>
+                </a:solidFill>
+              </a14:hiddenFill>
+            </a:ext>
+          </a:extLst>
+        </p:spPr>
+      </p:pic>
     </p:spTree>
     <p:extLst>
       <p:ext uri="{BB962C8B-B14F-4D97-AF65-F5344CB8AC3E}">
         <p14:creationId xmlns:p14="http://schemas.microsoft.com/office/powerpoint/2010/main" val="464679821"/>
+      </p:ext>
+    </p:extLst>
+  </p:cSld>
+  <p:clrMapOvr>
+    <a:masterClrMapping/>
+  </p:clrMapOvr>
+</p:sld>
+</file>
+
+<file path=ppt/slides/slide10.xml><?xml version="1.0" encoding="utf-8"?>
+<p:sld xmlns:a="http://schemas.openxmlformats.org/drawingml/2006/main" xmlns:r="http://schemas.openxmlformats.org/officeDocument/2006/relationships" xmlns:p="http://schemas.openxmlformats.org/presentationml/2006/main">
+  <p:cSld>
+    <p:bg>
+      <p:bgPr>
+        <a:solidFill>
+          <a:schemeClr val="tx1">
+            <a:lumMod val="50000"/>
+          </a:schemeClr>
+        </a:solidFill>
+        <a:effectLst/>
+      </p:bgPr>
+    </p:bg>
+    <p:spTree>
+      <p:nvGrpSpPr>
+        <p:cNvPr id="1" name=""/>
+        <p:cNvGrpSpPr/>
+        <p:nvPr/>
+      </p:nvGrpSpPr>
+      <p:grpSpPr>
+        <a:xfrm>
+          <a:off x="0" y="0"/>
+          <a:ext cx="0" cy="0"/>
+          <a:chOff x="0" y="0"/>
+          <a:chExt cx="0" cy="0"/>
+        </a:xfrm>
+      </p:grpSpPr>
+      <p:sp>
+        <p:nvSpPr>
+          <p:cNvPr id="2" name="Title 1">
+            <a:extLst>
+              <a:ext uri="{FF2B5EF4-FFF2-40B4-BE49-F238E27FC236}">
+                <a16:creationId xmlns:a16="http://schemas.microsoft.com/office/drawing/2014/main" id="{F6F704F6-725F-41C5-9511-95FD9BD22673}"/>
+              </a:ext>
+            </a:extLst>
+          </p:cNvPr>
+          <p:cNvSpPr>
+            <a:spLocks noGrp="1"/>
+          </p:cNvSpPr>
+          <p:nvPr>
+            <p:ph type="title"/>
+          </p:nvPr>
+        </p:nvSpPr>
+        <p:spPr>
+          <a:xfrm>
+            <a:off x="302079" y="272624"/>
+            <a:ext cx="10515600" cy="1120747"/>
+          </a:xfrm>
+        </p:spPr>
+        <p:txBody>
+          <a:bodyPr/>
+          <a:lstStyle/>
+          <a:p>
+            <a:r>
+              <a:rPr lang="en-AU" sz="4000" b="0" dirty="0">
+                <a:solidFill>
+                  <a:schemeClr val="accent6">
+                    <a:lumMod val="50000"/>
+                  </a:schemeClr>
+                </a:solidFill>
+              </a:rPr>
+              <a:t>What have you learnt</a:t>
+            </a:r>
+            <a:endParaRPr lang="en-AU" dirty="0">
+              <a:solidFill>
+                <a:schemeClr val="accent6">
+                  <a:lumMod val="50000"/>
+                </a:schemeClr>
+              </a:solidFill>
+            </a:endParaRPr>
+          </a:p>
+        </p:txBody>
+      </p:sp>
+      <p:sp>
+        <p:nvSpPr>
+          <p:cNvPr id="3" name="Text Placeholder 2">
+            <a:extLst>
+              <a:ext uri="{FF2B5EF4-FFF2-40B4-BE49-F238E27FC236}">
+                <a16:creationId xmlns:a16="http://schemas.microsoft.com/office/drawing/2014/main" id="{3D3DEBF5-A893-4404-A977-CB79992DAC23}"/>
+              </a:ext>
+            </a:extLst>
+          </p:cNvPr>
+          <p:cNvSpPr>
+            <a:spLocks noGrp="1"/>
+          </p:cNvSpPr>
+          <p:nvPr>
+            <p:ph type="body" sz="quarter" idx="10"/>
+          </p:nvPr>
+        </p:nvSpPr>
+        <p:spPr>
+          <a:xfrm>
+            <a:off x="380400" y="1894367"/>
+            <a:ext cx="10515600" cy="4081890"/>
+          </a:xfrm>
+        </p:spPr>
+        <p:txBody>
+          <a:bodyPr/>
+          <a:lstStyle/>
+          <a:p>
+            <a:br>
+              <a:rPr lang="en-AU" dirty="0"/>
+            </a:br>
+            <a:br>
+              <a:rPr lang="en-AU" dirty="0"/>
+            </a:br>
+            <a:endParaRPr lang="en-AU" dirty="0"/>
+          </a:p>
+        </p:txBody>
+      </p:sp>
+    </p:spTree>
+    <p:extLst>
+      <p:ext uri="{BB962C8B-B14F-4D97-AF65-F5344CB8AC3E}">
+        <p14:creationId xmlns:p14="http://schemas.microsoft.com/office/powerpoint/2010/main" val="1429922113"/>
+      </p:ext>
+    </p:extLst>
+  </p:cSld>
+  <p:clrMapOvr>
+    <a:masterClrMapping/>
+  </p:clrMapOvr>
+</p:sld>
+</file>
+
+<file path=ppt/slides/slide11.xml><?xml version="1.0" encoding="utf-8"?>
+<p:sld xmlns:a="http://schemas.openxmlformats.org/drawingml/2006/main" xmlns:r="http://schemas.openxmlformats.org/officeDocument/2006/relationships" xmlns:p="http://schemas.openxmlformats.org/presentationml/2006/main">
+  <p:cSld>
+    <p:bg>
+      <p:bgPr>
+        <a:solidFill>
+          <a:schemeClr val="tx1">
+            <a:lumMod val="50000"/>
+          </a:schemeClr>
+        </a:solidFill>
+        <a:effectLst/>
+      </p:bgPr>
+    </p:bg>
+    <p:spTree>
+      <p:nvGrpSpPr>
+        <p:cNvPr id="1" name=""/>
+        <p:cNvGrpSpPr/>
+        <p:nvPr/>
+      </p:nvGrpSpPr>
+      <p:grpSpPr>
+        <a:xfrm>
+          <a:off x="0" y="0"/>
+          <a:ext cx="0" cy="0"/>
+          <a:chOff x="0" y="0"/>
+          <a:chExt cx="0" cy="0"/>
+        </a:xfrm>
+      </p:grpSpPr>
+      <p:sp>
+        <p:nvSpPr>
+          <p:cNvPr id="2" name="Title 1">
+            <a:extLst>
+              <a:ext uri="{FF2B5EF4-FFF2-40B4-BE49-F238E27FC236}">
+                <a16:creationId xmlns:a16="http://schemas.microsoft.com/office/drawing/2014/main" id="{F6F704F6-725F-41C5-9511-95FD9BD22673}"/>
+              </a:ext>
+            </a:extLst>
+          </p:cNvPr>
+          <p:cNvSpPr>
+            <a:spLocks noGrp="1"/>
+          </p:cNvSpPr>
+          <p:nvPr>
+            <p:ph type="title"/>
+          </p:nvPr>
+        </p:nvSpPr>
+        <p:spPr>
+          <a:xfrm>
+            <a:off x="302079" y="272624"/>
+            <a:ext cx="10515600" cy="1120747"/>
+          </a:xfrm>
+        </p:spPr>
+        <p:txBody>
+          <a:bodyPr/>
+          <a:lstStyle/>
+          <a:p>
+            <a:r>
+              <a:rPr lang="en-AU" sz="4000" b="0" dirty="0">
+                <a:solidFill>
+                  <a:schemeClr val="accent6">
+                    <a:lumMod val="50000"/>
+                  </a:schemeClr>
+                </a:solidFill>
+              </a:rPr>
+              <a:t>What’s next</a:t>
+            </a:r>
+            <a:endParaRPr lang="en-AU" dirty="0">
+              <a:solidFill>
+                <a:schemeClr val="accent6">
+                  <a:lumMod val="50000"/>
+                </a:schemeClr>
+              </a:solidFill>
+            </a:endParaRPr>
+          </a:p>
+        </p:txBody>
+      </p:sp>
+      <p:sp>
+        <p:nvSpPr>
+          <p:cNvPr id="3" name="Text Placeholder 2">
+            <a:extLst>
+              <a:ext uri="{FF2B5EF4-FFF2-40B4-BE49-F238E27FC236}">
+                <a16:creationId xmlns:a16="http://schemas.microsoft.com/office/drawing/2014/main" id="{3D3DEBF5-A893-4404-A977-CB79992DAC23}"/>
+              </a:ext>
+            </a:extLst>
+          </p:cNvPr>
+          <p:cNvSpPr>
+            <a:spLocks noGrp="1"/>
+          </p:cNvSpPr>
+          <p:nvPr>
+            <p:ph type="body" sz="quarter" idx="10"/>
+          </p:nvPr>
+        </p:nvSpPr>
+        <p:spPr>
+          <a:xfrm>
+            <a:off x="380400" y="1894367"/>
+            <a:ext cx="10515600" cy="4081890"/>
+          </a:xfrm>
+        </p:spPr>
+        <p:txBody>
+          <a:bodyPr/>
+          <a:lstStyle/>
+          <a:p>
+            <a:pPr marL="457200" indent="-457200">
+              <a:buFont typeface="Arial" panose="020B0604020202020204" pitchFamily="34" charset="0"/>
+              <a:buChar char="•"/>
+            </a:pPr>
+            <a:r>
+              <a:rPr lang="en-AU" dirty="0"/>
+              <a:t>Share your team name and members with me Charlotte Trembecki</a:t>
+            </a:r>
+          </a:p>
+          <a:p>
+            <a:pPr marL="457200" indent="-457200">
+              <a:buFont typeface="Arial" panose="020B0604020202020204" pitchFamily="34" charset="0"/>
+              <a:buChar char="•"/>
+            </a:pPr>
+            <a:endParaRPr lang="en-AU" dirty="0"/>
+          </a:p>
+          <a:p>
+            <a:pPr marL="457200" indent="-457200">
+              <a:buFont typeface="Arial" panose="020B0604020202020204" pitchFamily="34" charset="0"/>
+              <a:buChar char="•"/>
+            </a:pPr>
+            <a:r>
+              <a:rPr lang="en-AU" dirty="0"/>
+              <a:t>Get hacking!</a:t>
+            </a:r>
+          </a:p>
+        </p:txBody>
+      </p:sp>
+    </p:spTree>
+    <p:extLst>
+      <p:ext uri="{BB962C8B-B14F-4D97-AF65-F5344CB8AC3E}">
+        <p14:creationId xmlns:p14="http://schemas.microsoft.com/office/powerpoint/2010/main" val="2180793918"/>
+      </p:ext>
+    </p:extLst>
+  </p:cSld>
+  <p:clrMapOvr>
+    <a:masterClrMapping/>
+  </p:clrMapOvr>
+</p:sld>
+</file>
+
+<file path=ppt/slides/slide12.xml><?xml version="1.0" encoding="utf-8"?>
+<p:sld xmlns:a="http://schemas.openxmlformats.org/drawingml/2006/main" xmlns:r="http://schemas.openxmlformats.org/officeDocument/2006/relationships" xmlns:p="http://schemas.openxmlformats.org/presentationml/2006/main">
+  <p:cSld>
+    <p:bg>
+      <p:bgPr>
+        <a:solidFill>
+          <a:schemeClr val="tx1">
+            <a:lumMod val="50000"/>
+          </a:schemeClr>
+        </a:solidFill>
+        <a:effectLst/>
+      </p:bgPr>
+    </p:bg>
+    <p:spTree>
+      <p:nvGrpSpPr>
+        <p:cNvPr id="1" name=""/>
+        <p:cNvGrpSpPr/>
+        <p:nvPr/>
+      </p:nvGrpSpPr>
+      <p:grpSpPr>
+        <a:xfrm>
+          <a:off x="0" y="0"/>
+          <a:ext cx="0" cy="0"/>
+          <a:chOff x="0" y="0"/>
+          <a:chExt cx="0" cy="0"/>
+        </a:xfrm>
+      </p:grpSpPr>
+      <p:sp>
+        <p:nvSpPr>
+          <p:cNvPr id="2" name="Title 1">
+            <a:extLst>
+              <a:ext uri="{FF2B5EF4-FFF2-40B4-BE49-F238E27FC236}">
+                <a16:creationId xmlns:a16="http://schemas.microsoft.com/office/drawing/2014/main" id="{F6F704F6-725F-41C5-9511-95FD9BD22673}"/>
+              </a:ext>
+            </a:extLst>
+          </p:cNvPr>
+          <p:cNvSpPr>
+            <a:spLocks noGrp="1"/>
+          </p:cNvSpPr>
+          <p:nvPr>
+            <p:ph type="title"/>
+          </p:nvPr>
+        </p:nvSpPr>
+        <p:spPr>
+          <a:xfrm>
+            <a:off x="302079" y="272624"/>
+            <a:ext cx="10515600" cy="1120747"/>
+          </a:xfrm>
+        </p:spPr>
+        <p:txBody>
+          <a:bodyPr/>
+          <a:lstStyle/>
+          <a:p>
+            <a:r>
+              <a:rPr lang="en-AU" sz="4000" b="0" dirty="0">
+                <a:solidFill>
+                  <a:schemeClr val="accent6">
+                    <a:lumMod val="50000"/>
+                  </a:schemeClr>
+                </a:solidFill>
+              </a:rPr>
+              <a:t>References</a:t>
+            </a:r>
+            <a:endParaRPr lang="en-AU" dirty="0">
+              <a:solidFill>
+                <a:schemeClr val="accent6">
+                  <a:lumMod val="50000"/>
+                </a:schemeClr>
+              </a:solidFill>
+            </a:endParaRPr>
+          </a:p>
+        </p:txBody>
+      </p:sp>
+      <p:sp>
+        <p:nvSpPr>
+          <p:cNvPr id="3" name="Text Placeholder 2">
+            <a:extLst>
+              <a:ext uri="{FF2B5EF4-FFF2-40B4-BE49-F238E27FC236}">
+                <a16:creationId xmlns:a16="http://schemas.microsoft.com/office/drawing/2014/main" id="{3D3DEBF5-A893-4404-A977-CB79992DAC23}"/>
+              </a:ext>
+            </a:extLst>
+          </p:cNvPr>
+          <p:cNvSpPr>
+            <a:spLocks noGrp="1"/>
+          </p:cNvSpPr>
+          <p:nvPr>
+            <p:ph type="body" sz="quarter" idx="10"/>
+          </p:nvPr>
+        </p:nvSpPr>
+        <p:spPr>
+          <a:xfrm>
+            <a:off x="380400" y="1894367"/>
+            <a:ext cx="10515600" cy="4081890"/>
+          </a:xfrm>
+        </p:spPr>
+        <p:txBody>
+          <a:bodyPr/>
+          <a:lstStyle/>
+          <a:p>
+            <a:pPr marL="457200" indent="-457200">
+              <a:buFont typeface="Arial" panose="020B0604020202020204" pitchFamily="34" charset="0"/>
+              <a:buChar char="•"/>
+            </a:pPr>
+            <a:br>
+              <a:rPr lang="en-AU" dirty="0">
+                <a:hlinkClick r:id="rId2"/>
+              </a:rPr>
+            </a:br>
+            <a:r>
+              <a:rPr lang="en-AU" dirty="0">
+                <a:hlinkClick r:id="rId2"/>
+              </a:rPr>
+              <a:t>https://qr.io/</a:t>
+            </a:r>
+            <a:endParaRPr lang="en-AU" dirty="0"/>
+          </a:p>
+          <a:p>
+            <a:pPr marL="457200" indent="-457200">
+              <a:buFont typeface="Arial" panose="020B0604020202020204" pitchFamily="34" charset="0"/>
+              <a:buChar char="•"/>
+            </a:pPr>
+            <a:endParaRPr lang="en-AU" dirty="0"/>
+          </a:p>
+          <a:p>
+            <a:pPr marL="457200" indent="-457200">
+              <a:buFont typeface="Arial" panose="020B0604020202020204" pitchFamily="34" charset="0"/>
+              <a:buChar char="•"/>
+            </a:pPr>
+            <a:r>
+              <a:rPr lang="en-AU" dirty="0"/>
+              <a:t>Encoder and Decoder library for .NET 6</a:t>
+            </a:r>
+            <a:br>
+              <a:rPr lang="en-AU" dirty="0">
+                <a:hlinkClick r:id="rId3"/>
+              </a:rPr>
+            </a:br>
+            <a:r>
+              <a:rPr lang="en-AU" dirty="0">
+                <a:hlinkClick r:id="rId3"/>
+              </a:rPr>
+              <a:t>https://www.codeproject.com/Articles/1250071/QR-Code-Encoder-and-Decoder-Csharp-Class-Library-f</a:t>
+            </a:r>
+            <a:endParaRPr lang="en-AU" dirty="0"/>
+          </a:p>
+          <a:p>
+            <a:pPr marL="457200" indent="-457200">
+              <a:buFont typeface="Arial" panose="020B0604020202020204" pitchFamily="34" charset="0"/>
+              <a:buChar char="•"/>
+            </a:pPr>
+            <a:endParaRPr lang="en-AU" dirty="0"/>
+          </a:p>
+          <a:p>
+            <a:pPr marL="457200" indent="-457200">
+              <a:buFont typeface="Arial" panose="020B0604020202020204" pitchFamily="34" charset="0"/>
+              <a:buChar char="•"/>
+            </a:pPr>
+            <a:endParaRPr lang="en-AU" dirty="0"/>
+          </a:p>
+          <a:p>
+            <a:pPr marL="457200" indent="-457200">
+              <a:buFont typeface="Arial" panose="020B0604020202020204" pitchFamily="34" charset="0"/>
+              <a:buChar char="•"/>
+            </a:pPr>
+            <a:r>
+              <a:rPr lang="en-AU" dirty="0"/>
+              <a:t>Get hacking!</a:t>
+            </a:r>
+          </a:p>
+        </p:txBody>
+      </p:sp>
+      <p:pic>
+        <p:nvPicPr>
+          <p:cNvPr id="1026" name="Picture 2" descr="QR Code Encoder Demo">
+            <a:extLst>
+              <a:ext uri="{FF2B5EF4-FFF2-40B4-BE49-F238E27FC236}">
+                <a16:creationId xmlns:a16="http://schemas.microsoft.com/office/drawing/2014/main" id="{8CA9FD79-C4A2-2140-48DE-BAE89146294C}"/>
+              </a:ext>
+            </a:extLst>
+          </p:cNvPr>
+          <p:cNvPicPr>
+            <a:picLocks noChangeAspect="1" noChangeArrowheads="1"/>
+          </p:cNvPicPr>
+          <p:nvPr/>
+        </p:nvPicPr>
+        <p:blipFill>
+          <a:blip r:embed="rId4">
+            <a:extLst>
+              <a:ext uri="{28A0092B-C50C-407E-A947-70E740481C1C}">
+                <a14:useLocalDpi xmlns:a14="http://schemas.microsoft.com/office/drawing/2010/main" val="0"/>
+              </a:ext>
+            </a:extLst>
+          </a:blip>
+          <a:srcRect/>
+          <a:stretch>
+            <a:fillRect/>
+          </a:stretch>
+        </p:blipFill>
+        <p:spPr bwMode="auto">
+          <a:xfrm>
+            <a:off x="9130798" y="4317541"/>
+            <a:ext cx="2838119" cy="2354752"/>
+          </a:xfrm>
+          <a:prstGeom prst="rect">
+            <a:avLst/>
+          </a:prstGeom>
+          <a:noFill/>
+          <a:extLst>
+            <a:ext uri="{909E8E84-426E-40DD-AFC4-6F175D3DCCD1}">
+              <a14:hiddenFill xmlns:a14="http://schemas.microsoft.com/office/drawing/2010/main">
+                <a:solidFill>
+                  <a:srgbClr val="FFFFFF"/>
+                </a:solidFill>
+              </a14:hiddenFill>
+            </a:ext>
+          </a:extLst>
+        </p:spPr>
+      </p:pic>
+    </p:spTree>
+    <p:extLst>
+      <p:ext uri="{BB962C8B-B14F-4D97-AF65-F5344CB8AC3E}">
+        <p14:creationId xmlns:p14="http://schemas.microsoft.com/office/powerpoint/2010/main" val="786747057"/>
       </p:ext>
     </p:extLst>
   </p:cSld>
@@ -3684,27 +4338,8 @@
                   </a:schemeClr>
                 </a:solidFill>
               </a:rPr>
-              <a:t>1pm Kick off with donuts </a:t>
-            </a:r>
-            <a:r>
-              <a:rPr lang="en-AU" b="0">
-                <a:solidFill>
-                  <a:schemeClr val="tx1">
-                    <a:lumMod val="40000"/>
-                    <a:lumOff val="60000"/>
-                  </a:schemeClr>
-                </a:solidFill>
-              </a:rPr>
-              <a:t>and fruit</a:t>
-            </a:r>
-            <a:endParaRPr lang="en-AU" b="0" dirty="0">
-              <a:solidFill>
-                <a:schemeClr val="tx1">
-                  <a:lumMod val="40000"/>
-                  <a:lumOff val="60000"/>
-                </a:schemeClr>
-              </a:solidFill>
-            </a:endParaRPr>
+              <a:t>1pm Kick off with donuts and fruit</a:t>
+            </a:r>
           </a:p>
           <a:p>
             <a:pPr marL="457200" indent="-457200">
@@ -4030,7 +4665,7 @@
         <p:spPr>
           <a:xfrm>
             <a:off x="302079" y="272624"/>
-            <a:ext cx="10515600" cy="1120747"/>
+            <a:ext cx="10515600" cy="2025649"/>
           </a:xfrm>
         </p:spPr>
         <p:txBody>
@@ -4045,7 +4680,7 @@
                   </a:schemeClr>
                 </a:solidFill>
               </a:rPr>
-              <a:t>What have you achieved</a:t>
+              <a:t>Title: Problem / Something trying to learn</a:t>
             </a:r>
             <a:endParaRPr lang="en-AU" dirty="0">
               <a:solidFill>
@@ -4057,104 +4692,104 @@
           </a:p>
         </p:txBody>
       </p:sp>
-      <p:sp>
-        <p:nvSpPr>
-          <p:cNvPr id="3" name="Text Placeholder 2">
-            <a:extLst>
-              <a:ext uri="{FF2B5EF4-FFF2-40B4-BE49-F238E27FC236}">
-                <a16:creationId xmlns:a16="http://schemas.microsoft.com/office/drawing/2014/main" id="{3D3DEBF5-A893-4404-A977-CB79992DAC23}"/>
-              </a:ext>
-            </a:extLst>
-          </p:cNvPr>
-          <p:cNvSpPr>
-            <a:spLocks noGrp="1"/>
-          </p:cNvSpPr>
-          <p:nvPr>
-            <p:ph type="body" sz="quarter" idx="10"/>
-          </p:nvPr>
-        </p:nvSpPr>
-        <p:spPr>
-          <a:xfrm>
-            <a:off x="380400" y="1894367"/>
-            <a:ext cx="10515600" cy="4081890"/>
-          </a:xfrm>
-        </p:spPr>
-        <p:txBody>
-          <a:bodyPr/>
-          <a:lstStyle/>
-          <a:p>
-            <a:r>
-              <a:rPr lang="en-AU" sz="2800" i="1" dirty="0"/>
-              <a:t>Give your solution a name</a:t>
-            </a:r>
-          </a:p>
-          <a:p>
-            <a:endParaRPr lang="en-AU" sz="2800" i="1" dirty="0"/>
-          </a:p>
-          <a:p>
-            <a:r>
-              <a:rPr lang="en-AU" sz="2800" i="1" dirty="0"/>
-              <a:t>Describe your idea in one sentence (who it will help and how)</a:t>
-            </a:r>
-          </a:p>
-          <a:p>
-            <a:pPr marL="259175" indent="-259175">
-              <a:buFont typeface="Arial" panose="020B0604020202020204" pitchFamily="34" charset="0"/>
-              <a:buChar char="•"/>
-            </a:pPr>
-            <a:endParaRPr lang="en-AU" sz="2800" dirty="0"/>
-          </a:p>
-          <a:p>
-            <a:r>
-              <a:rPr lang="en-AU" sz="2800" i="1" dirty="0"/>
-              <a:t>Show your solution/idea</a:t>
-            </a:r>
-          </a:p>
-          <a:p>
-            <a:pPr marL="259175" indent="-259175">
-              <a:buFont typeface="Arial" panose="020B0604020202020204" pitchFamily="34" charset="0"/>
-              <a:buChar char="•"/>
-            </a:pPr>
-            <a:r>
-              <a:rPr lang="en-AU" sz="2800" dirty="0"/>
-              <a:t>Demo</a:t>
-            </a:r>
-          </a:p>
-          <a:p>
-            <a:pPr marL="259175" indent="-259175">
-              <a:buFont typeface="Arial" panose="020B0604020202020204" pitchFamily="34" charset="0"/>
-              <a:buChar char="•"/>
-            </a:pPr>
-            <a:r>
-              <a:rPr lang="en-AU" sz="2800" dirty="0"/>
-              <a:t>Screen shots</a:t>
-            </a:r>
-          </a:p>
-          <a:p>
-            <a:pPr marL="259175" indent="-259175">
-              <a:buFont typeface="Arial" panose="020B0604020202020204" pitchFamily="34" charset="0"/>
-              <a:buChar char="•"/>
-            </a:pPr>
-            <a:r>
-              <a:rPr lang="en-AU" sz="2800" dirty="0"/>
-              <a:t>Process flows</a:t>
-            </a:r>
-          </a:p>
-          <a:p>
-            <a:br>
-              <a:rPr lang="en-AU" dirty="0"/>
-            </a:br>
-            <a:br>
-              <a:rPr lang="en-AU" dirty="0"/>
-            </a:br>
-            <a:endParaRPr lang="en-AU" dirty="0"/>
-          </a:p>
-        </p:txBody>
-      </p:sp>
+      <p:pic>
+        <p:nvPicPr>
+          <p:cNvPr id="4098" name="Picture 2" descr="Car Crashes: Scott May's Daredevil Stunt Show">
+            <a:extLst>
+              <a:ext uri="{FF2B5EF4-FFF2-40B4-BE49-F238E27FC236}">
+                <a16:creationId xmlns:a16="http://schemas.microsoft.com/office/drawing/2014/main" id="{9A4A6CCE-010C-8D36-360A-CE5DCA460A86}"/>
+              </a:ext>
+            </a:extLst>
+          </p:cNvPr>
+          <p:cNvPicPr>
+            <a:picLocks noChangeAspect="1" noChangeArrowheads="1"/>
+          </p:cNvPicPr>
+          <p:nvPr/>
+        </p:nvPicPr>
+        <p:blipFill>
+          <a:blip r:embed="rId2">
+            <a:extLst>
+              <a:ext uri="{28A0092B-C50C-407E-A947-70E740481C1C}">
+                <a14:useLocalDpi xmlns:a14="http://schemas.microsoft.com/office/drawing/2010/main" val="0"/>
+              </a:ext>
+            </a:extLst>
+          </a:blip>
+          <a:srcRect/>
+          <a:stretch>
+            <a:fillRect/>
+          </a:stretch>
+        </p:blipFill>
+        <p:spPr bwMode="auto">
+          <a:xfrm>
+            <a:off x="382524" y="2477708"/>
+            <a:ext cx="3713988" cy="2477230"/>
+          </a:xfrm>
+          <a:prstGeom prst="rect">
+            <a:avLst/>
+          </a:prstGeom>
+          <a:noFill/>
+          <a:extLst>
+            <a:ext uri="{909E8E84-426E-40DD-AFC4-6F175D3DCCD1}">
+              <a14:hiddenFill xmlns:a14="http://schemas.microsoft.com/office/drawing/2010/main">
+                <a:solidFill>
+                  <a:srgbClr val="FFFFFF"/>
+                </a:solidFill>
+              </a14:hiddenFill>
+            </a:ext>
+          </a:extLst>
+        </p:spPr>
+      </p:pic>
+      <p:pic>
+        <p:nvPicPr>
+          <p:cNvPr id="4100" name="Picture 4">
+            <a:extLst>
+              <a:ext uri="{FF2B5EF4-FFF2-40B4-BE49-F238E27FC236}">
+                <a16:creationId xmlns:a16="http://schemas.microsoft.com/office/drawing/2014/main" id="{1622FF12-FE52-F232-B173-B04286D06953}"/>
+              </a:ext>
+            </a:extLst>
+          </p:cNvPr>
+          <p:cNvPicPr>
+            <a:picLocks noChangeAspect="1" noChangeArrowheads="1"/>
+          </p:cNvPicPr>
+          <p:nvPr/>
+        </p:nvPicPr>
+        <p:blipFill>
+          <a:blip r:embed="rId3">
+            <a:extLst>
+              <a:ext uri="{28A0092B-C50C-407E-A947-70E740481C1C}">
+                <a14:useLocalDpi xmlns:a14="http://schemas.microsoft.com/office/drawing/2010/main" val="0"/>
+              </a:ext>
+            </a:extLst>
+          </a:blip>
+          <a:srcRect/>
+          <a:stretch>
+            <a:fillRect/>
+          </a:stretch>
+        </p:blipFill>
+        <p:spPr bwMode="auto">
+          <a:xfrm>
+            <a:off x="5330585" y="3182112"/>
+            <a:ext cx="4405730" cy="2932176"/>
+          </a:xfrm>
+          <a:prstGeom prst="rect">
+            <a:avLst/>
+          </a:prstGeom>
+          <a:noFill/>
+          <a:extLst>
+            <a:ext uri="{909E8E84-426E-40DD-AFC4-6F175D3DCCD1}">
+              <a14:hiddenFill xmlns:a14="http://schemas.microsoft.com/office/drawing/2010/main">
+                <a:solidFill>
+                  <a:srgbClr val="FFFFFF"/>
+                </a:solidFill>
+              </a14:hiddenFill>
+            </a:ext>
+          </a:extLst>
+        </p:spPr>
+      </p:pic>
     </p:spTree>
     <p:extLst>
       <p:ext uri="{BB962C8B-B14F-4D97-AF65-F5344CB8AC3E}">
-        <p14:creationId xmlns:p14="http://schemas.microsoft.com/office/powerpoint/2010/main" val="2389472638"/>
+        <p14:creationId xmlns:p14="http://schemas.microsoft.com/office/powerpoint/2010/main" val="1200325911"/>
       </p:ext>
     </p:extLst>
   </p:cSld>
@@ -4210,7 +4845,7 @@
         <p:spPr>
           <a:xfrm>
             <a:off x="302079" y="272624"/>
-            <a:ext cx="10515600" cy="1120747"/>
+            <a:ext cx="10515600" cy="1143221"/>
           </a:xfrm>
         </p:spPr>
         <p:txBody>
@@ -4218,130 +4853,92 @@
           <a:lstStyle/>
           <a:p>
             <a:r>
-              <a:rPr lang="en-AU" sz="4000" b="0" dirty="0">
+              <a:rPr lang="en-AU" dirty="0">
                 <a:solidFill>
                   <a:schemeClr val="accent6">
                     <a:lumMod val="50000"/>
                   </a:schemeClr>
                 </a:solidFill>
               </a:rPr>
-              <a:t>What can RAC get out of this</a:t>
-            </a:r>
-            <a:endParaRPr lang="en-AU" dirty="0">
-              <a:solidFill>
-                <a:schemeClr val="accent6">
-                  <a:lumMod val="50000"/>
-                </a:schemeClr>
-              </a:solidFill>
-            </a:endParaRPr>
-          </a:p>
-        </p:txBody>
-      </p:sp>
-      <p:sp>
-        <p:nvSpPr>
-          <p:cNvPr id="3" name="Text Placeholder 2">
-            <a:extLst>
-              <a:ext uri="{FF2B5EF4-FFF2-40B4-BE49-F238E27FC236}">
-                <a16:creationId xmlns:a16="http://schemas.microsoft.com/office/drawing/2014/main" id="{3D3DEBF5-A893-4404-A977-CB79992DAC23}"/>
-              </a:ext>
-            </a:extLst>
-          </p:cNvPr>
-          <p:cNvSpPr>
-            <a:spLocks noGrp="1"/>
-          </p:cNvSpPr>
-          <p:nvPr>
-            <p:ph type="body" sz="quarter" idx="10"/>
-          </p:nvPr>
-        </p:nvSpPr>
-        <p:spPr>
-          <a:xfrm>
-            <a:off x="380400" y="1894367"/>
-            <a:ext cx="10515600" cy="4081890"/>
-          </a:xfrm>
-        </p:spPr>
-        <p:txBody>
-          <a:bodyPr/>
-          <a:lstStyle/>
-          <a:p>
-            <a:r>
-              <a:rPr lang="en-AU" sz="2800" i="1" dirty="0"/>
-              <a:t>Describe why the idea should be implemented in one sentence </a:t>
-            </a:r>
-          </a:p>
-          <a:p>
-            <a:endParaRPr lang="en-AU" i="1" dirty="0"/>
-          </a:p>
-          <a:p>
-            <a:r>
-              <a:rPr lang="en-AU" i="1" dirty="0"/>
-              <a:t>Key Success Metrics i.e.</a:t>
-            </a:r>
-          </a:p>
-          <a:p>
-            <a:pPr marL="342900" indent="-342900">
-              <a:buFont typeface="Arial" panose="020B0604020202020204" pitchFamily="34" charset="0"/>
-              <a:buChar char="•"/>
-            </a:pPr>
-            <a:r>
-              <a:rPr lang="en-AU" dirty="0"/>
-              <a:t>Business value</a:t>
-            </a:r>
-          </a:p>
-          <a:p>
-            <a:pPr marL="342900" indent="-342900">
-              <a:buFont typeface="Arial" panose="020B0604020202020204" pitchFamily="34" charset="0"/>
-              <a:buChar char="•"/>
-            </a:pPr>
-            <a:r>
-              <a:rPr lang="en-AU" dirty="0"/>
-              <a:t>Time savings</a:t>
-            </a:r>
-          </a:p>
-          <a:p>
-            <a:pPr marL="342900" indent="-342900">
-              <a:buFont typeface="Arial" panose="020B0604020202020204" pitchFamily="34" charset="0"/>
-              <a:buChar char="•"/>
-            </a:pPr>
-            <a:r>
-              <a:rPr lang="en-AU" dirty="0"/>
-              <a:t>Cost savings</a:t>
-            </a:r>
-          </a:p>
-          <a:p>
-            <a:pPr marL="342900" indent="-342900">
-              <a:buFont typeface="Arial" panose="020B0604020202020204" pitchFamily="34" charset="0"/>
-              <a:buChar char="•"/>
-            </a:pPr>
-            <a:r>
-              <a:rPr lang="en-AU" dirty="0"/>
-              <a:t>Member  benefits</a:t>
-            </a:r>
-          </a:p>
-          <a:p>
-            <a:pPr marL="342900" indent="-342900">
-              <a:buFont typeface="Arial" panose="020B0604020202020204" pitchFamily="34" charset="0"/>
-              <a:buChar char="•"/>
-            </a:pPr>
-            <a:r>
-              <a:rPr lang="en-AU" dirty="0"/>
-              <a:t>Training benefit</a:t>
-            </a:r>
-          </a:p>
-          <a:p>
-            <a:br>
-              <a:rPr lang="en-AU" dirty="0"/>
-            </a:br>
-            <a:br>
-              <a:rPr lang="en-AU" dirty="0"/>
-            </a:br>
-            <a:endParaRPr lang="en-AU" dirty="0"/>
-          </a:p>
-        </p:txBody>
-      </p:sp>
+              <a:t>Making a claim</a:t>
+            </a:r>
+          </a:p>
+        </p:txBody>
+      </p:sp>
+      <p:pic>
+        <p:nvPicPr>
+          <p:cNvPr id="11" name="Picture 10">
+            <a:extLst>
+              <a:ext uri="{FF2B5EF4-FFF2-40B4-BE49-F238E27FC236}">
+                <a16:creationId xmlns:a16="http://schemas.microsoft.com/office/drawing/2014/main" id="{C49A1032-7546-470B-0ECC-06709C55784A}"/>
+              </a:ext>
+            </a:extLst>
+          </p:cNvPr>
+          <p:cNvPicPr>
+            <a:picLocks noChangeAspect="1"/>
+          </p:cNvPicPr>
+          <p:nvPr/>
+        </p:nvPicPr>
+        <p:blipFill>
+          <a:blip r:embed="rId2"/>
+          <a:stretch>
+            <a:fillRect/>
+          </a:stretch>
+        </p:blipFill>
+        <p:spPr>
+          <a:xfrm>
+            <a:off x="6543234" y="844234"/>
+            <a:ext cx="5011147" cy="4492752"/>
+          </a:xfrm>
+          <a:prstGeom prst="rect">
+            <a:avLst/>
+          </a:prstGeom>
+          <a:ln>
+            <a:solidFill>
+              <a:schemeClr val="tx1"/>
+            </a:solidFill>
+          </a:ln>
+        </p:spPr>
+      </p:pic>
+      <p:pic>
+        <p:nvPicPr>
+          <p:cNvPr id="9" name="Picture 8">
+            <a:extLst>
+              <a:ext uri="{FF2B5EF4-FFF2-40B4-BE49-F238E27FC236}">
+                <a16:creationId xmlns:a16="http://schemas.microsoft.com/office/drawing/2014/main" id="{6F4903DF-DE9B-0E76-CE41-C67A3FF6200F}"/>
+              </a:ext>
+            </a:extLst>
+          </p:cNvPr>
+          <p:cNvPicPr>
+            <a:picLocks noChangeAspect="1"/>
+          </p:cNvPicPr>
+          <p:nvPr/>
+        </p:nvPicPr>
+        <p:blipFill>
+          <a:blip r:embed="rId3"/>
+          <a:stretch>
+            <a:fillRect/>
+          </a:stretch>
+        </p:blipFill>
+        <p:spPr>
+          <a:xfrm>
+            <a:off x="821203" y="2956035"/>
+            <a:ext cx="5851837" cy="3315015"/>
+          </a:xfrm>
+          <a:prstGeom prst="rect">
+            <a:avLst/>
+          </a:prstGeom>
+          <a:ln>
+            <a:solidFill>
+              <a:schemeClr val="tx1"/>
+            </a:solidFill>
+          </a:ln>
+        </p:spPr>
+      </p:pic>
     </p:spTree>
     <p:extLst>
       <p:ext uri="{BB962C8B-B14F-4D97-AF65-F5344CB8AC3E}">
-        <p14:creationId xmlns:p14="http://schemas.microsoft.com/office/powerpoint/2010/main" val="3541879880"/>
+        <p14:creationId xmlns:p14="http://schemas.microsoft.com/office/powerpoint/2010/main" val="4281392262"/>
       </p:ext>
     </p:extLst>
   </p:cSld>
@@ -4397,7 +4994,7 @@
         <p:spPr>
           <a:xfrm>
             <a:off x="302079" y="272624"/>
-            <a:ext cx="10515600" cy="1120747"/>
+            <a:ext cx="10515600" cy="2025649"/>
           </a:xfrm>
         </p:spPr>
         <p:txBody>
@@ -4405,14 +5002,14 @@
           <a:lstStyle/>
           <a:p>
             <a:r>
-              <a:rPr lang="en-AU" sz="4000" b="0" dirty="0">
+              <a:rPr lang="en-AU" sz="7200" b="0" dirty="0">
                 <a:solidFill>
                   <a:schemeClr val="accent6">
                     <a:lumMod val="50000"/>
                   </a:schemeClr>
                 </a:solidFill>
               </a:rPr>
-              <a:t>What have you learnt</a:t>
+              <a:t>What are QR Codes?</a:t>
             </a:r>
             <a:endParaRPr lang="en-AU" dirty="0">
               <a:solidFill>
@@ -4442,14 +5039,24 @@
         </p:nvSpPr>
         <p:spPr>
           <a:xfrm>
-            <a:off x="380400" y="1894367"/>
-            <a:ext cx="10515600" cy="4081890"/>
+            <a:off x="511028" y="2732567"/>
+            <a:ext cx="10515600" cy="3451923"/>
           </a:xfrm>
         </p:spPr>
         <p:txBody>
           <a:bodyPr/>
           <a:lstStyle/>
           <a:p>
+            <a:r>
+              <a:rPr lang="en-AU" dirty="0"/>
+              <a:t>They were created in 1994 by Denso Wave to track vehicles during manufacturing. They quickly gain popularity when it spread to smartphones.</a:t>
+            </a:r>
+          </a:p>
+          <a:p>
+            <a:r>
+              <a:rPr lang="en-AU" dirty="0"/>
+              <a:t>You can now even scan QR Codes from your phone camera.</a:t>
+            </a:r>
             <a:br>
               <a:rPr lang="en-AU" dirty="0"/>
             </a:br>
@@ -4463,7 +5070,7 @@
     </p:spTree>
     <p:extLst>
       <p:ext uri="{BB962C8B-B14F-4D97-AF65-F5344CB8AC3E}">
-        <p14:creationId xmlns:p14="http://schemas.microsoft.com/office/powerpoint/2010/main" val="1429922113"/>
+        <p14:creationId xmlns:p14="http://schemas.microsoft.com/office/powerpoint/2010/main" val="2118228054"/>
       </p:ext>
     </p:extLst>
   </p:cSld>
@@ -4519,7 +5126,7 @@
         <p:spPr>
           <a:xfrm>
             <a:off x="302079" y="272624"/>
-            <a:ext cx="10515600" cy="1120747"/>
+            <a:ext cx="10515600" cy="2025649"/>
           </a:xfrm>
         </p:spPr>
         <p:txBody>
@@ -4527,14 +5134,14 @@
           <a:lstStyle/>
           <a:p>
             <a:r>
-              <a:rPr lang="en-AU" sz="4000" b="0" dirty="0">
+              <a:rPr lang="en-AU" sz="7200" b="0" dirty="0">
                 <a:solidFill>
                   <a:schemeClr val="accent6">
                     <a:lumMod val="50000"/>
                   </a:schemeClr>
                 </a:solidFill>
               </a:rPr>
-              <a:t>What’s next</a:t>
+              <a:t>What are QR Codes?</a:t>
             </a:r>
             <a:endParaRPr lang="en-AU" dirty="0">
               <a:solidFill>
@@ -4546,6 +5153,139 @@
           </a:p>
         </p:txBody>
       </p:sp>
+      <p:pic>
+        <p:nvPicPr>
+          <p:cNvPr id="3074" name="Picture 2" descr="How do QR Codes Work: A Quick Guide">
+            <a:extLst>
+              <a:ext uri="{FF2B5EF4-FFF2-40B4-BE49-F238E27FC236}">
+                <a16:creationId xmlns:a16="http://schemas.microsoft.com/office/drawing/2014/main" id="{3DAA5323-DE9F-071C-1617-5782462495B6}"/>
+              </a:ext>
+            </a:extLst>
+          </p:cNvPr>
+          <p:cNvPicPr>
+            <a:picLocks noChangeAspect="1" noChangeArrowheads="1"/>
+          </p:cNvPicPr>
+          <p:nvPr/>
+        </p:nvPicPr>
+        <p:blipFill>
+          <a:blip r:embed="rId2">
+            <a:extLst>
+              <a:ext uri="{28A0092B-C50C-407E-A947-70E740481C1C}">
+                <a14:useLocalDpi xmlns:a14="http://schemas.microsoft.com/office/drawing/2010/main" val="0"/>
+              </a:ext>
+            </a:extLst>
+          </a:blip>
+          <a:srcRect/>
+          <a:stretch>
+            <a:fillRect/>
+          </a:stretch>
+        </p:blipFill>
+        <p:spPr bwMode="auto">
+          <a:xfrm>
+            <a:off x="587631" y="2447052"/>
+            <a:ext cx="6940110" cy="4052071"/>
+          </a:xfrm>
+          <a:prstGeom prst="rect">
+            <a:avLst/>
+          </a:prstGeom>
+          <a:noFill/>
+          <a:extLst>
+            <a:ext uri="{909E8E84-426E-40DD-AFC4-6F175D3DCCD1}">
+              <a14:hiddenFill xmlns:a14="http://schemas.microsoft.com/office/drawing/2010/main">
+                <a:solidFill>
+                  <a:srgbClr val="FFFFFF"/>
+                </a:solidFill>
+              </a14:hiddenFill>
+            </a:ext>
+          </a:extLst>
+        </p:spPr>
+      </p:pic>
+    </p:spTree>
+    <p:extLst>
+      <p:ext uri="{BB962C8B-B14F-4D97-AF65-F5344CB8AC3E}">
+        <p14:creationId xmlns:p14="http://schemas.microsoft.com/office/powerpoint/2010/main" val="247323114"/>
+      </p:ext>
+    </p:extLst>
+  </p:cSld>
+  <p:clrMapOvr>
+    <a:masterClrMapping/>
+  </p:clrMapOvr>
+</p:sld>
+</file>
+
+<file path=ppt/slides/slide8.xml><?xml version="1.0" encoding="utf-8"?>
+<p:sld xmlns:a="http://schemas.openxmlformats.org/drawingml/2006/main" xmlns:r="http://schemas.openxmlformats.org/officeDocument/2006/relationships" xmlns:p="http://schemas.openxmlformats.org/presentationml/2006/main">
+  <p:cSld>
+    <p:bg>
+      <p:bgPr>
+        <a:solidFill>
+          <a:schemeClr val="tx1">
+            <a:lumMod val="50000"/>
+          </a:schemeClr>
+        </a:solidFill>
+        <a:effectLst/>
+      </p:bgPr>
+    </p:bg>
+    <p:spTree>
+      <p:nvGrpSpPr>
+        <p:cNvPr id="1" name=""/>
+        <p:cNvGrpSpPr/>
+        <p:nvPr/>
+      </p:nvGrpSpPr>
+      <p:grpSpPr>
+        <a:xfrm>
+          <a:off x="0" y="0"/>
+          <a:ext cx="0" cy="0"/>
+          <a:chOff x="0" y="0"/>
+          <a:chExt cx="0" cy="0"/>
+        </a:xfrm>
+      </p:grpSpPr>
+      <p:sp>
+        <p:nvSpPr>
+          <p:cNvPr id="2" name="Title 1">
+            <a:extLst>
+              <a:ext uri="{FF2B5EF4-FFF2-40B4-BE49-F238E27FC236}">
+                <a16:creationId xmlns:a16="http://schemas.microsoft.com/office/drawing/2014/main" id="{F6F704F6-725F-41C5-9511-95FD9BD22673}"/>
+              </a:ext>
+            </a:extLst>
+          </p:cNvPr>
+          <p:cNvSpPr>
+            <a:spLocks noGrp="1"/>
+          </p:cNvSpPr>
+          <p:nvPr>
+            <p:ph type="title"/>
+          </p:nvPr>
+        </p:nvSpPr>
+        <p:spPr>
+          <a:xfrm>
+            <a:off x="302079" y="272624"/>
+            <a:ext cx="10515600" cy="1120747"/>
+          </a:xfrm>
+        </p:spPr>
+        <p:txBody>
+          <a:bodyPr/>
+          <a:lstStyle/>
+          <a:p>
+            <a:r>
+              <a:rPr lang="en-AU" sz="7200" b="0" dirty="0">
+                <a:solidFill>
+                  <a:schemeClr val="accent6">
+                    <a:lumMod val="50000"/>
+                  </a:schemeClr>
+                </a:solidFill>
+              </a:rPr>
+              <a:t>What have you achieved</a:t>
+            </a:r>
+            <a:endParaRPr lang="en-AU" dirty="0">
+              <a:solidFill>
+                <a:schemeClr val="accent6">
+                  <a:lumMod val="50000"/>
+                </a:schemeClr>
+              </a:solidFill>
+            </a:endParaRPr>
+          </a:p>
+        </p:txBody>
+      </p:sp>
       <p:sp>
         <p:nvSpPr>
           <p:cNvPr id="3" name="Text Placeholder 2">
@@ -4572,38 +5312,265 @@
           <a:bodyPr/>
           <a:lstStyle/>
           <a:p>
-            <a:pPr marL="457200" indent="-457200">
+            <a:r>
+              <a:rPr lang="en-AU" sz="2800" i="1" dirty="0"/>
+              <a:t>Give your solution a name</a:t>
+            </a:r>
+          </a:p>
+          <a:p>
+            <a:endParaRPr lang="en-AU" sz="2800" i="1" dirty="0"/>
+          </a:p>
+          <a:p>
+            <a:r>
+              <a:rPr lang="en-AU" sz="2800" i="1" dirty="0"/>
+              <a:t>Describe your idea in one sentence (who it will help and how)</a:t>
+            </a:r>
+          </a:p>
+          <a:p>
+            <a:pPr marL="259175" indent="-259175">
               <a:buFont typeface="Arial" panose="020B0604020202020204" pitchFamily="34" charset="0"/>
               <a:buChar char="•"/>
             </a:pPr>
-            <a:r>
-              <a:rPr lang="en-AU" dirty="0"/>
-              <a:t>Share your team name and members with me Charlotte Trembecki</a:t>
-            </a:r>
-          </a:p>
-          <a:p>
-            <a:pPr marL="457200" indent="-457200">
+            <a:endParaRPr lang="en-AU" sz="2800" dirty="0"/>
+          </a:p>
+          <a:p>
+            <a:r>
+              <a:rPr lang="en-AU" sz="2800" i="1" dirty="0"/>
+              <a:t>Show your solution/idea</a:t>
+            </a:r>
+          </a:p>
+          <a:p>
+            <a:pPr marL="259175" indent="-259175">
               <a:buFont typeface="Arial" panose="020B0604020202020204" pitchFamily="34" charset="0"/>
               <a:buChar char="•"/>
             </a:pPr>
-            <a:endParaRPr lang="en-AU" dirty="0"/>
-          </a:p>
-          <a:p>
-            <a:pPr marL="457200" indent="-457200">
+            <a:r>
+              <a:rPr lang="en-AU" sz="2800" dirty="0"/>
+              <a:t>Demo</a:t>
+            </a:r>
+          </a:p>
+          <a:p>
+            <a:pPr marL="259175" indent="-259175">
               <a:buFont typeface="Arial" panose="020B0604020202020204" pitchFamily="34" charset="0"/>
               <a:buChar char="•"/>
             </a:pPr>
             <a:r>
+              <a:rPr lang="en-AU" sz="2800" dirty="0"/>
+              <a:t>Screen shots</a:t>
+            </a:r>
+          </a:p>
+          <a:p>
+            <a:pPr marL="259175" indent="-259175">
+              <a:buFont typeface="Arial" panose="020B0604020202020204" pitchFamily="34" charset="0"/>
+              <a:buChar char="•"/>
+            </a:pPr>
+            <a:r>
+              <a:rPr lang="en-AU" sz="2800" dirty="0"/>
+              <a:t>Process flows</a:t>
+            </a:r>
+          </a:p>
+          <a:p>
+            <a:br>
               <a:rPr lang="en-AU" dirty="0"/>
-              <a:t>Get hacking!</a:t>
-            </a:r>
+            </a:br>
+            <a:br>
+              <a:rPr lang="en-AU" dirty="0"/>
+            </a:br>
+            <a:endParaRPr lang="en-AU" dirty="0"/>
           </a:p>
         </p:txBody>
       </p:sp>
     </p:spTree>
     <p:extLst>
       <p:ext uri="{BB962C8B-B14F-4D97-AF65-F5344CB8AC3E}">
-        <p14:creationId xmlns:p14="http://schemas.microsoft.com/office/powerpoint/2010/main" val="2180793918"/>
+        <p14:creationId xmlns:p14="http://schemas.microsoft.com/office/powerpoint/2010/main" val="2389472638"/>
+      </p:ext>
+    </p:extLst>
+  </p:cSld>
+  <p:clrMapOvr>
+    <a:masterClrMapping/>
+  </p:clrMapOvr>
+</p:sld>
+</file>
+
+<file path=ppt/slides/slide9.xml><?xml version="1.0" encoding="utf-8"?>
+<p:sld xmlns:a="http://schemas.openxmlformats.org/drawingml/2006/main" xmlns:r="http://schemas.openxmlformats.org/officeDocument/2006/relationships" xmlns:p="http://schemas.openxmlformats.org/presentationml/2006/main">
+  <p:cSld>
+    <p:bg>
+      <p:bgPr>
+        <a:solidFill>
+          <a:schemeClr val="tx1">
+            <a:lumMod val="50000"/>
+          </a:schemeClr>
+        </a:solidFill>
+        <a:effectLst/>
+      </p:bgPr>
+    </p:bg>
+    <p:spTree>
+      <p:nvGrpSpPr>
+        <p:cNvPr id="1" name=""/>
+        <p:cNvGrpSpPr/>
+        <p:nvPr/>
+      </p:nvGrpSpPr>
+      <p:grpSpPr>
+        <a:xfrm>
+          <a:off x="0" y="0"/>
+          <a:ext cx="0" cy="0"/>
+          <a:chOff x="0" y="0"/>
+          <a:chExt cx="0" cy="0"/>
+        </a:xfrm>
+      </p:grpSpPr>
+      <p:sp>
+        <p:nvSpPr>
+          <p:cNvPr id="2" name="Title 1">
+            <a:extLst>
+              <a:ext uri="{FF2B5EF4-FFF2-40B4-BE49-F238E27FC236}">
+                <a16:creationId xmlns:a16="http://schemas.microsoft.com/office/drawing/2014/main" id="{F6F704F6-725F-41C5-9511-95FD9BD22673}"/>
+              </a:ext>
+            </a:extLst>
+          </p:cNvPr>
+          <p:cNvSpPr>
+            <a:spLocks noGrp="1"/>
+          </p:cNvSpPr>
+          <p:nvPr>
+            <p:ph type="title"/>
+          </p:nvPr>
+        </p:nvSpPr>
+        <p:spPr>
+          <a:xfrm>
+            <a:off x="302079" y="272624"/>
+            <a:ext cx="10515600" cy="1120747"/>
+          </a:xfrm>
+        </p:spPr>
+        <p:txBody>
+          <a:bodyPr/>
+          <a:lstStyle/>
+          <a:p>
+            <a:r>
+              <a:rPr lang="en-AU" sz="4000" b="0" dirty="0">
+                <a:solidFill>
+                  <a:schemeClr val="accent6">
+                    <a:lumMod val="50000"/>
+                  </a:schemeClr>
+                </a:solidFill>
+              </a:rPr>
+              <a:t>What can RAC get out of this</a:t>
+            </a:r>
+            <a:endParaRPr lang="en-AU" dirty="0">
+              <a:solidFill>
+                <a:schemeClr val="accent6">
+                  <a:lumMod val="50000"/>
+                </a:schemeClr>
+              </a:solidFill>
+            </a:endParaRPr>
+          </a:p>
+        </p:txBody>
+      </p:sp>
+      <p:sp>
+        <p:nvSpPr>
+          <p:cNvPr id="3" name="Text Placeholder 2">
+            <a:extLst>
+              <a:ext uri="{FF2B5EF4-FFF2-40B4-BE49-F238E27FC236}">
+                <a16:creationId xmlns:a16="http://schemas.microsoft.com/office/drawing/2014/main" id="{3D3DEBF5-A893-4404-A977-CB79992DAC23}"/>
+              </a:ext>
+            </a:extLst>
+          </p:cNvPr>
+          <p:cNvSpPr>
+            <a:spLocks noGrp="1"/>
+          </p:cNvSpPr>
+          <p:nvPr>
+            <p:ph type="body" sz="quarter" idx="10"/>
+          </p:nvPr>
+        </p:nvSpPr>
+        <p:spPr>
+          <a:xfrm>
+            <a:off x="380400" y="1894367"/>
+            <a:ext cx="10515600" cy="4081890"/>
+          </a:xfrm>
+        </p:spPr>
+        <p:txBody>
+          <a:bodyPr/>
+          <a:lstStyle/>
+          <a:p>
+            <a:r>
+              <a:rPr lang="en-AU" sz="2800" i="1" dirty="0"/>
+              <a:t>Describe why the idea should be implemented in one sentence </a:t>
+            </a:r>
+          </a:p>
+          <a:p>
+            <a:endParaRPr lang="en-AU" i="1" dirty="0"/>
+          </a:p>
+          <a:p>
+            <a:r>
+              <a:rPr lang="en-AU" i="1" dirty="0"/>
+              <a:t>Key Success Metrics i.e.</a:t>
+            </a:r>
+          </a:p>
+          <a:p>
+            <a:pPr marL="342900" indent="-342900">
+              <a:buFont typeface="Arial" panose="020B0604020202020204" pitchFamily="34" charset="0"/>
+              <a:buChar char="•"/>
+            </a:pPr>
+            <a:r>
+              <a:rPr lang="en-AU" dirty="0"/>
+              <a:t>Business value</a:t>
+            </a:r>
+          </a:p>
+          <a:p>
+            <a:pPr marL="342900" indent="-342900">
+              <a:buFont typeface="Arial" panose="020B0604020202020204" pitchFamily="34" charset="0"/>
+              <a:buChar char="•"/>
+            </a:pPr>
+            <a:r>
+              <a:rPr lang="en-AU" dirty="0"/>
+              <a:t>Time savings</a:t>
+            </a:r>
+          </a:p>
+          <a:p>
+            <a:pPr marL="342900" indent="-342900">
+              <a:buFont typeface="Arial" panose="020B0604020202020204" pitchFamily="34" charset="0"/>
+              <a:buChar char="•"/>
+            </a:pPr>
+            <a:r>
+              <a:rPr lang="en-AU" dirty="0"/>
+              <a:t>Cost savings</a:t>
+            </a:r>
+          </a:p>
+          <a:p>
+            <a:pPr marL="342900" indent="-342900">
+              <a:buFont typeface="Arial" panose="020B0604020202020204" pitchFamily="34" charset="0"/>
+              <a:buChar char="•"/>
+            </a:pPr>
+            <a:r>
+              <a:rPr lang="en-AU" dirty="0"/>
+              <a:t>Member  benefits</a:t>
+            </a:r>
+          </a:p>
+          <a:p>
+            <a:pPr marL="342900" indent="-342900">
+              <a:buFont typeface="Arial" panose="020B0604020202020204" pitchFamily="34" charset="0"/>
+              <a:buChar char="•"/>
+            </a:pPr>
+            <a:r>
+              <a:rPr lang="en-AU" dirty="0"/>
+              <a:t>Training benefit</a:t>
+            </a:r>
+          </a:p>
+          <a:p>
+            <a:br>
+              <a:rPr lang="en-AU" dirty="0"/>
+            </a:br>
+            <a:br>
+              <a:rPr lang="en-AU" dirty="0"/>
+            </a:br>
+            <a:endParaRPr lang="en-AU" dirty="0"/>
+          </a:p>
+        </p:txBody>
+      </p:sp>
+    </p:spTree>
+    <p:extLst>
+      <p:ext uri="{BB962C8B-B14F-4D97-AF65-F5344CB8AC3E}">
+        <p14:creationId xmlns:p14="http://schemas.microsoft.com/office/powerpoint/2010/main" val="3541879880"/>
       </p:ext>
     </p:extLst>
   </p:cSld>

</xml_diff>